<commit_message>
Tested functionality, some alterations
</commit_message>
<xml_diff>
--- a/Assignment2ppt.pptx
+++ b/Assignment2ppt.pptx
@@ -232,7 +232,7 @@
             <a:pPr rtl="0"/>
             <a:fld id="{CA71881C-9934-4390-83D4-00A1706901B0}" type="datetime1">
               <a:rPr lang="de-DE" smtClean="0"/>
-              <a:t>15.11.2023</a:t>
+              <a:t>18.11.2023</a:t>
             </a:fld>
             <a:endParaRPr lang="de-DE"/>
           </a:p>
@@ -414,7 +414,7 @@
             <a:fld id="{768E27D2-03F2-438B-AB0C-EA2A702A54A3}" type="datetime1">
               <a:rPr lang="de-DE" smtClean="0"/>
               <a:pPr/>
-              <a:t>15.11.2023</a:t>
+              <a:t>18.11.2023</a:t>
             </a:fld>
             <a:endParaRPr lang="de-DE" dirty="0"/>
           </a:p>
@@ -9613,7 +9613,7 @@
         <p:spPr>
           <a:xfrm>
             <a:off x="767837" y="2417351"/>
-            <a:ext cx="6541525" cy="2939266"/>
+            <a:ext cx="6541525" cy="3683060"/>
           </a:xfrm>
           <a:prstGeom prst="rect">
             <a:avLst/>
@@ -9909,6 +9909,41 @@
                 <a:cs typeface="+mn-cs"/>
               </a:rPr>
               <a:t>Return the predicted movie score, rounding it to three decimal places.</a:t>
+            </a:r>
+          </a:p>
+          <a:p>
+            <a:pPr marL="342900" marR="0" lvl="0" indent="-342900" algn="l" defTabSz="914400" rtl="0" eaLnBrk="1" fontAlgn="auto" latinLnBrk="0" hangingPunct="1">
+              <a:lnSpc>
+                <a:spcPct val="100000"/>
+              </a:lnSpc>
+              <a:spcBef>
+                <a:spcPts val="1000"/>
+              </a:spcBef>
+              <a:spcAft>
+                <a:spcPts val="0"/>
+              </a:spcAft>
+              <a:buClr>
+                <a:srgbClr val="201449">
+                  <a:lumMod val="10000"/>
+                  <a:lumOff val="90000"/>
+                </a:srgbClr>
+              </a:buClr>
+              <a:buSzPct val="80000"/>
+              <a:buFont typeface="Arial" panose="020B0604020202020204" pitchFamily="34" charset="0"/>
+              <a:buChar char="•"/>
+              <a:tabLst/>
+              <a:defRPr/>
+            </a:pPr>
+            <a:r>
+              <a:rPr lang="en-US" sz="2000" dirty="0">
+                <a:solidFill>
+                  <a:srgbClr val="201449">
+                    <a:alpha val="70000"/>
+                  </a:srgbClr>
+                </a:solidFill>
+                <a:latin typeface="Avenir Next LT Pro"/>
+              </a:rPr>
+              <a:t>If user has already rated the movie, use the rating as is.</a:t>
             </a:r>
             <a:endParaRPr kumimoji="0" lang="de-DE" sz="2000" b="0" i="0" u="none" strike="noStrike" kern="1200" cap="none" spc="0" normalizeH="0" baseline="0" noProof="0" dirty="0">
               <a:ln>
@@ -9961,66 +9996,33 @@
       </p:grpSpPr>
       <p:pic>
         <p:nvPicPr>
-          <p:cNvPr id="11" name="Picture Placeholder 10">
-            <a:extLst>
-              <a:ext uri="{FF2B5EF4-FFF2-40B4-BE49-F238E27FC236}">
-                <a16:creationId xmlns:a16="http://schemas.microsoft.com/office/drawing/2014/main" id="{8FE95A33-8C4B-F33C-F7F6-0D3FE4393457}"/>
+          <p:cNvPr id="15" name="Picture 14">
+            <a:extLst>
+              <a:ext uri="{FF2B5EF4-FFF2-40B4-BE49-F238E27FC236}">
+                <a16:creationId xmlns:a16="http://schemas.microsoft.com/office/drawing/2014/main" id="{C6E63F42-E59F-06E6-5EF0-964DB5DD3442}"/>
               </a:ext>
             </a:extLst>
           </p:cNvPr>
           <p:cNvPicPr>
-            <a:picLocks noGrp="1" noChangeAspect="1"/>
+            <a:picLocks noChangeAspect="1"/>
           </p:cNvPicPr>
-          <p:nvPr>
-            <p:ph type="pic" sz="quarter" idx="13"/>
-          </p:nvPr>
+          <p:nvPr/>
         </p:nvPicPr>
         <p:blipFill>
           <a:blip r:embed="rId2"/>
-          <a:srcRect t="22563" b="22563"/>
+          <a:srcRect/>
           <a:stretch/>
         </p:blipFill>
         <p:spPr>
           <a:xfrm>
-            <a:off x="7938" y="-23813"/>
-            <a:ext cx="4287837" cy="6881813"/>
-          </a:xfrm>
+            <a:off x="52051" y="1544006"/>
+            <a:ext cx="4243724" cy="3793800"/>
+          </a:xfrm>
+          <a:prstGeom prst="rect">
+            <a:avLst/>
+          </a:prstGeom>
         </p:spPr>
       </p:pic>
-      <p:sp>
-        <p:nvSpPr>
-          <p:cNvPr id="2" name="Title 1">
-            <a:extLst>
-              <a:ext uri="{FF2B5EF4-FFF2-40B4-BE49-F238E27FC236}">
-                <a16:creationId xmlns:a16="http://schemas.microsoft.com/office/drawing/2014/main" id="{EA001574-1AF6-6E03-5A5E-BA6599033F9F}"/>
-              </a:ext>
-            </a:extLst>
-          </p:cNvPr>
-          <p:cNvSpPr>
-            <a:spLocks noGrp="1"/>
-          </p:cNvSpPr>
-          <p:nvPr>
-            <p:ph type="title"/>
-          </p:nvPr>
-        </p:nvSpPr>
-        <p:spPr>
-          <a:xfrm>
-            <a:off x="4522015" y="255250"/>
-            <a:ext cx="7491369" cy="2076450"/>
-          </a:xfrm>
-        </p:spPr>
-        <p:txBody>
-          <a:bodyPr/>
-          <a:lstStyle/>
-          <a:p>
-            <a:r>
-              <a:rPr lang="de-DE" dirty="0" err="1"/>
-              <a:t>get_top_recommended_movies</a:t>
-            </a:r>
-            <a:endParaRPr lang="de-DE" dirty="0"/>
-          </a:p>
-        </p:txBody>
-      </p:sp>
       <p:sp>
         <p:nvSpPr>
           <p:cNvPr id="3" name="Content Placeholder 2">
@@ -10052,25 +10054,66 @@
               <a:buChar char="•"/>
             </a:pPr>
             <a:r>
-              <a:rPr lang="en-US" dirty="0"/>
-              <a:t>For a given </a:t>
-            </a:r>
-            <a:r>
-              <a:rPr lang="en-US" dirty="0" err="1"/>
-              <a:t>user_id</a:t>
-            </a:r>
-            <a:r>
-              <a:rPr lang="en-US" dirty="0"/>
-              <a:t> and a dictionary of </a:t>
-            </a:r>
-            <a:r>
-              <a:rPr lang="en-US" dirty="0" err="1"/>
-              <a:t>similar_users</a:t>
-            </a:r>
-            <a:r>
-              <a:rPr lang="en-US" dirty="0"/>
-              <a:t>, find movies not rated by the user.</a:t>
-            </a:r>
+              <a:rPr lang="de-DE" dirty="0" err="1"/>
+              <a:t>Calculate</a:t>
+            </a:r>
+            <a:r>
+              <a:rPr lang="de-DE" dirty="0"/>
+              <a:t> top 10 </a:t>
+            </a:r>
+            <a:r>
+              <a:rPr lang="de-DE" dirty="0" err="1"/>
+              <a:t>recommended</a:t>
+            </a:r>
+            <a:r>
+              <a:rPr lang="de-DE" dirty="0"/>
+              <a:t> </a:t>
+            </a:r>
+            <a:r>
+              <a:rPr lang="de-DE" dirty="0" err="1"/>
+              <a:t>movies</a:t>
+            </a:r>
+            <a:r>
+              <a:rPr lang="de-DE" dirty="0"/>
+              <a:t> </a:t>
+            </a:r>
+            <a:r>
+              <a:rPr lang="de-DE" dirty="0" err="1"/>
+              <a:t>for</a:t>
+            </a:r>
+            <a:r>
+              <a:rPr lang="de-DE" dirty="0"/>
+              <a:t> a </a:t>
+            </a:r>
+            <a:r>
+              <a:rPr lang="de-DE" dirty="0" err="1"/>
+              <a:t>given</a:t>
+            </a:r>
+            <a:r>
+              <a:rPr lang="de-DE" dirty="0"/>
+              <a:t> </a:t>
+            </a:r>
+            <a:r>
+              <a:rPr lang="de-DE" dirty="0" err="1"/>
+              <a:t>group</a:t>
+            </a:r>
+            <a:r>
+              <a:rPr lang="de-DE" dirty="0"/>
+              <a:t> </a:t>
+            </a:r>
+            <a:r>
+              <a:rPr lang="de-DE" dirty="0" err="1"/>
+              <a:t>of</a:t>
+            </a:r>
+            <a:r>
+              <a:rPr lang="de-DE" dirty="0"/>
+              <a:t> </a:t>
+            </a:r>
+            <a:r>
+              <a:rPr lang="de-DE" dirty="0" err="1"/>
+              <a:t>users</a:t>
+            </a:r>
+            <a:endParaRPr lang="de-DE" dirty="0"/>
           </a:p>
           <a:p>
             <a:pPr marL="342900" indent="-342900">
@@ -10078,17 +10121,42 @@
               <a:buChar char="•"/>
             </a:pPr>
             <a:r>
-              <a:rPr lang="en-US" dirty="0"/>
-              <a:t>Predict the scores for unrated movies using the </a:t>
-            </a:r>
-            <a:r>
-              <a:rPr lang="en-US" dirty="0" err="1"/>
-              <a:t>predict_movie_score</a:t>
-            </a:r>
-            <a:r>
-              <a:rPr lang="en-US" dirty="0"/>
-              <a:t> function.</a:t>
-            </a:r>
+              <a:rPr lang="de-DE" dirty="0" err="1"/>
+              <a:t>Choose</a:t>
+            </a:r>
+            <a:r>
+              <a:rPr lang="de-DE" dirty="0"/>
+              <a:t> </a:t>
+            </a:r>
+            <a:r>
+              <a:rPr lang="de-DE" dirty="0" err="1"/>
+              <a:t>from</a:t>
+            </a:r>
+            <a:r>
+              <a:rPr lang="de-DE" dirty="0"/>
+              <a:t> </a:t>
+            </a:r>
+            <a:r>
+              <a:rPr lang="de-DE" dirty="0" err="1"/>
+              <a:t>three</a:t>
+            </a:r>
+            <a:r>
+              <a:rPr lang="de-DE" dirty="0"/>
+              <a:t> different </a:t>
+            </a:r>
+            <a:r>
+              <a:rPr lang="de-DE" dirty="0" err="1"/>
+              <a:t>aggregation</a:t>
+            </a:r>
+            <a:r>
+              <a:rPr lang="de-DE" dirty="0"/>
+              <a:t> </a:t>
+            </a:r>
+            <a:r>
+              <a:rPr lang="de-DE" dirty="0" err="1"/>
+              <a:t>methods</a:t>
+            </a:r>
+            <a:endParaRPr lang="de-DE" dirty="0"/>
           </a:p>
           <a:p>
             <a:pPr marL="342900" indent="-342900">
@@ -10096,8 +10164,237 @@
               <a:buChar char="•"/>
             </a:pPr>
             <a:r>
-              <a:rPr lang="en-US" dirty="0"/>
-              <a:t>Return the top 10 recommended movies sorted by predicted scores in descending order.</a:t>
+              <a:rPr lang="de-DE" dirty="0"/>
+              <a:t>Takes </a:t>
+            </a:r>
+            <a:r>
+              <a:rPr lang="de-DE" dirty="0" err="1"/>
+              <a:t>existing</a:t>
+            </a:r>
+            <a:r>
+              <a:rPr lang="de-DE" dirty="0"/>
+              <a:t> </a:t>
+            </a:r>
+            <a:r>
+              <a:rPr lang="de-DE" dirty="0" err="1"/>
+              <a:t>ratings</a:t>
+            </a:r>
+            <a:r>
+              <a:rPr lang="de-DE" dirty="0"/>
+              <a:t> </a:t>
+            </a:r>
+            <a:r>
+              <a:rPr lang="de-DE" dirty="0" err="1"/>
+              <a:t>from</a:t>
+            </a:r>
+            <a:r>
+              <a:rPr lang="de-DE" dirty="0"/>
+              <a:t> </a:t>
+            </a:r>
+            <a:r>
+              <a:rPr lang="de-DE" dirty="0" err="1"/>
+              <a:t>each</a:t>
+            </a:r>
+            <a:r>
+              <a:rPr lang="de-DE" dirty="0"/>
+              <a:t> </a:t>
+            </a:r>
+            <a:r>
+              <a:rPr lang="de-DE" dirty="0" err="1"/>
+              <a:t>user</a:t>
+            </a:r>
+            <a:r>
+              <a:rPr lang="de-DE" dirty="0"/>
+              <a:t> and </a:t>
+            </a:r>
+            <a:r>
+              <a:rPr lang="de-DE" dirty="0" err="1"/>
+              <a:t>predicts</a:t>
+            </a:r>
+            <a:r>
+              <a:rPr lang="de-DE" dirty="0"/>
+              <a:t> </a:t>
+            </a:r>
+            <a:r>
+              <a:rPr lang="de-DE" dirty="0" err="1"/>
+              <a:t>the</a:t>
+            </a:r>
+            <a:r>
+              <a:rPr lang="de-DE" dirty="0"/>
+              <a:t> </a:t>
+            </a:r>
+            <a:r>
+              <a:rPr lang="de-DE" dirty="0" err="1"/>
+              <a:t>rest</a:t>
+            </a:r>
+            <a:endParaRPr lang="de-DE" dirty="0"/>
+          </a:p>
+          <a:p>
+            <a:pPr marL="342900" indent="-342900">
+              <a:buFont typeface="Arial" panose="020B0604020202020204" pitchFamily="34" charset="0"/>
+              <a:buChar char="•"/>
+            </a:pPr>
+            <a:r>
+              <a:rPr lang="de-DE" dirty="0" err="1"/>
+              <a:t>Calculates</a:t>
+            </a:r>
+            <a:r>
+              <a:rPr lang="de-DE" dirty="0"/>
+              <a:t> </a:t>
+            </a:r>
+            <a:r>
+              <a:rPr lang="de-DE" dirty="0" err="1"/>
+              <a:t>aggregated</a:t>
+            </a:r>
+            <a:r>
+              <a:rPr lang="de-DE" dirty="0"/>
+              <a:t> </a:t>
+            </a:r>
+            <a:r>
+              <a:rPr lang="de-DE" dirty="0" err="1"/>
+              <a:t>scores</a:t>
+            </a:r>
+            <a:r>
+              <a:rPr lang="de-DE" dirty="0"/>
+              <a:t> </a:t>
+            </a:r>
+            <a:r>
+              <a:rPr lang="de-DE" dirty="0" err="1"/>
+              <a:t>for</a:t>
+            </a:r>
+            <a:r>
+              <a:rPr lang="de-DE" dirty="0"/>
+              <a:t> </a:t>
+            </a:r>
+            <a:r>
+              <a:rPr lang="de-DE" dirty="0" err="1"/>
+              <a:t>each</a:t>
+            </a:r>
+            <a:r>
+              <a:rPr lang="de-DE" dirty="0"/>
+              <a:t> </a:t>
+            </a:r>
+            <a:r>
+              <a:rPr lang="de-DE" dirty="0" err="1"/>
+              <a:t>movie</a:t>
+            </a:r>
+            <a:r>
+              <a:rPr lang="de-DE" dirty="0"/>
+              <a:t> and </a:t>
+            </a:r>
+            <a:r>
+              <a:rPr lang="de-DE" dirty="0" err="1"/>
+              <a:t>returns</a:t>
+            </a:r>
+            <a:r>
+              <a:rPr lang="de-DE" dirty="0"/>
+              <a:t> </a:t>
+            </a:r>
+            <a:r>
+              <a:rPr lang="de-DE" dirty="0" err="1"/>
+              <a:t>the</a:t>
+            </a:r>
+            <a:r>
+              <a:rPr lang="de-DE" dirty="0"/>
+              <a:t> top 10 </a:t>
+            </a:r>
+            <a:r>
+              <a:rPr lang="de-DE" dirty="0" err="1"/>
+              <a:t>best</a:t>
+            </a:r>
+            <a:r>
+              <a:rPr lang="de-DE" dirty="0"/>
+              <a:t> </a:t>
+            </a:r>
+            <a:r>
+              <a:rPr lang="de-DE" dirty="0" err="1"/>
+              <a:t>matches</a:t>
+            </a:r>
+            <a:r>
+              <a:rPr lang="de-DE" dirty="0"/>
+              <a:t> </a:t>
+            </a:r>
+            <a:r>
+              <a:rPr lang="de-DE" dirty="0" err="1"/>
+              <a:t>for</a:t>
+            </a:r>
+            <a:r>
+              <a:rPr lang="de-DE" dirty="0"/>
+              <a:t> </a:t>
+            </a:r>
+            <a:r>
+              <a:rPr lang="de-DE" dirty="0" err="1"/>
+              <a:t>the</a:t>
+            </a:r>
+            <a:r>
+              <a:rPr lang="de-DE" dirty="0"/>
+              <a:t> </a:t>
+            </a:r>
+            <a:r>
+              <a:rPr lang="de-DE" dirty="0" err="1"/>
+              <a:t>group</a:t>
+            </a:r>
+            <a:endParaRPr lang="de-DE" dirty="0"/>
+          </a:p>
+        </p:txBody>
+      </p:sp>
+      <p:pic>
+        <p:nvPicPr>
+          <p:cNvPr id="11" name="Picture Placeholder 10">
+            <a:extLst>
+              <a:ext uri="{FF2B5EF4-FFF2-40B4-BE49-F238E27FC236}">
+                <a16:creationId xmlns:a16="http://schemas.microsoft.com/office/drawing/2014/main" id="{8FE95A33-8C4B-F33C-F7F6-0D3FE4393457}"/>
+              </a:ext>
+            </a:extLst>
+          </p:cNvPr>
+          <p:cNvPicPr>
+            <a:picLocks noGrp="1" noChangeAspect="1"/>
+          </p:cNvPicPr>
+          <p:nvPr>
+            <p:ph type="pic" sz="quarter" idx="13"/>
+          </p:nvPr>
+        </p:nvPicPr>
+        <p:blipFill>
+          <a:blip r:embed="rId3"/>
+          <a:srcRect t="22563" b="22563"/>
+          <a:stretch/>
+        </p:blipFill>
+        <p:spPr>
+          <a:xfrm>
+            <a:off x="7938" y="-23813"/>
+            <a:ext cx="4287837" cy="6881813"/>
+          </a:xfrm>
+        </p:spPr>
+      </p:pic>
+      <p:sp>
+        <p:nvSpPr>
+          <p:cNvPr id="2" name="Title 1">
+            <a:extLst>
+              <a:ext uri="{FF2B5EF4-FFF2-40B4-BE49-F238E27FC236}">
+                <a16:creationId xmlns:a16="http://schemas.microsoft.com/office/drawing/2014/main" id="{EA001574-1AF6-6E03-5A5E-BA6599033F9F}"/>
+              </a:ext>
+            </a:extLst>
+          </p:cNvPr>
+          <p:cNvSpPr>
+            <a:spLocks noGrp="1"/>
+          </p:cNvSpPr>
+          <p:nvPr>
+            <p:ph type="title"/>
+          </p:nvPr>
+        </p:nvSpPr>
+        <p:spPr>
+          <a:xfrm>
+            <a:off x="4522015" y="255250"/>
+            <a:ext cx="7491369" cy="2076450"/>
+          </a:xfrm>
+        </p:spPr>
+        <p:txBody>
+          <a:bodyPr/>
+          <a:lstStyle/>
+          <a:p>
+            <a:r>
+              <a:rPr lang="de-DE" dirty="0" err="1"/>
+              <a:t>recommend_movies</a:t>
             </a:r>
             <a:endParaRPr lang="de-DE" dirty="0"/>
           </a:p>
@@ -10204,38 +10501,6 @@
           </a:p>
         </p:txBody>
       </p:sp>
-      <p:pic>
-        <p:nvPicPr>
-          <p:cNvPr id="15" name="Picture 14">
-            <a:extLst>
-              <a:ext uri="{FF2B5EF4-FFF2-40B4-BE49-F238E27FC236}">
-                <a16:creationId xmlns:a16="http://schemas.microsoft.com/office/drawing/2014/main" id="{C6E63F42-E59F-06E6-5EF0-964DB5DD3442}"/>
-              </a:ext>
-            </a:extLst>
-          </p:cNvPr>
-          <p:cNvPicPr>
-            <a:picLocks noChangeAspect="1"/>
-          </p:cNvPicPr>
-          <p:nvPr/>
-        </p:nvPicPr>
-        <p:blipFill>
-          <a:blip r:embed="rId3">
-            <a:alphaModFix amt="39000"/>
-          </a:blip>
-          <a:stretch>
-            <a:fillRect/>
-          </a:stretch>
-        </p:blipFill>
-        <p:spPr>
-          <a:xfrm>
-            <a:off x="52051" y="0"/>
-            <a:ext cx="4243724" cy="6881812"/>
-          </a:xfrm>
-          <a:prstGeom prst="rect">
-            <a:avLst/>
-          </a:prstGeom>
-        </p:spPr>
-      </p:pic>
     </p:spTree>
     <p:extLst>
       <p:ext uri="{BB962C8B-B14F-4D97-AF65-F5344CB8AC3E}">
@@ -10266,12 +10531,244 @@
           <a:chExt cx="0" cy="0"/>
         </a:xfrm>
       </p:grpSpPr>
+      <p:sp>
+        <p:nvSpPr>
+          <p:cNvPr id="2" name="Title 1">
+            <a:extLst>
+              <a:ext uri="{FF2B5EF4-FFF2-40B4-BE49-F238E27FC236}">
+                <a16:creationId xmlns:a16="http://schemas.microsoft.com/office/drawing/2014/main" id="{E46C5A0A-5F73-0840-583F-6EDAC3B240B9}"/>
+              </a:ext>
+            </a:extLst>
+          </p:cNvPr>
+          <p:cNvSpPr>
+            <a:spLocks noGrp="1"/>
+          </p:cNvSpPr>
+          <p:nvPr>
+            <p:ph type="title"/>
+          </p:nvPr>
+        </p:nvSpPr>
+        <p:spPr>
+          <a:xfrm>
+            <a:off x="519648" y="374480"/>
+            <a:ext cx="11406704" cy="830263"/>
+          </a:xfrm>
+          <a:noFill/>
+        </p:spPr>
+        <p:txBody>
+          <a:bodyPr/>
+          <a:lstStyle/>
+          <a:p>
+            <a:r>
+              <a:rPr lang="de-DE" dirty="0" err="1"/>
+              <a:t>group_recommendation_disagreements</a:t>
+            </a:r>
+            <a:endParaRPr lang="de-DE" dirty="0"/>
+          </a:p>
+        </p:txBody>
+      </p:sp>
+      <p:sp>
+        <p:nvSpPr>
+          <p:cNvPr id="3" name="Content Placeholder 2">
+            <a:extLst>
+              <a:ext uri="{FF2B5EF4-FFF2-40B4-BE49-F238E27FC236}">
+                <a16:creationId xmlns:a16="http://schemas.microsoft.com/office/drawing/2014/main" id="{37D47648-83A7-DF6C-5E2B-77318F0F55E6}"/>
+              </a:ext>
+            </a:extLst>
+          </p:cNvPr>
+          <p:cNvSpPr>
+            <a:spLocks noGrp="1"/>
+          </p:cNvSpPr>
+          <p:nvPr>
+            <p:ph idx="1"/>
+          </p:nvPr>
+        </p:nvSpPr>
+        <p:spPr>
+          <a:xfrm>
+            <a:off x="519648" y="1157786"/>
+            <a:ext cx="8327938" cy="2657517"/>
+          </a:xfrm>
+          <a:noFill/>
+        </p:spPr>
+        <p:txBody>
+          <a:bodyPr/>
+          <a:lstStyle/>
+          <a:p>
+            <a:pPr marL="342900" indent="-342900">
+              <a:buClr>
+                <a:schemeClr val="accent2">
+                  <a:lumMod val="40000"/>
+                  <a:lumOff val="60000"/>
+                </a:schemeClr>
+              </a:buClr>
+              <a:buFont typeface="Arial" panose="020B0604020202020204" pitchFamily="34" charset="0"/>
+              <a:buChar char="•"/>
+            </a:pPr>
+            <a:r>
+              <a:rPr lang="en-US" dirty="0"/>
+              <a:t>Calculate individual predictions for each user in the group using </a:t>
+            </a:r>
+            <a:r>
+              <a:rPr lang="en-US" dirty="0" err="1"/>
+              <a:t>predict_movie_score</a:t>
+            </a:r>
+            <a:r>
+              <a:rPr lang="en-US" dirty="0"/>
+              <a:t>.</a:t>
+            </a:r>
+          </a:p>
+          <a:p>
+            <a:pPr marL="342900" indent="-342900">
+              <a:buClr>
+                <a:schemeClr val="accent2">
+                  <a:lumMod val="40000"/>
+                  <a:lumOff val="60000"/>
+                </a:schemeClr>
+              </a:buClr>
+              <a:buFont typeface="Arial" panose="020B0604020202020204" pitchFamily="34" charset="0"/>
+              <a:buChar char="•"/>
+            </a:pPr>
+            <a:r>
+              <a:rPr lang="en-US" dirty="0"/>
+              <a:t>If no predictions are available, return None.</a:t>
+            </a:r>
+          </a:p>
+          <a:p>
+            <a:pPr marL="342900" indent="-342900">
+              <a:buClr>
+                <a:schemeClr val="accent2">
+                  <a:lumMod val="40000"/>
+                  <a:lumOff val="60000"/>
+                </a:schemeClr>
+              </a:buClr>
+              <a:buFont typeface="Arial" panose="020B0604020202020204" pitchFamily="34" charset="0"/>
+              <a:buChar char="•"/>
+            </a:pPr>
+            <a:r>
+              <a:rPr lang="en-US" dirty="0"/>
+              <a:t>Calculate the standard deviation of ratings across all users and the weighted average disagreements.</a:t>
+            </a:r>
+          </a:p>
+          <a:p>
+            <a:pPr marL="342900" indent="-342900">
+              <a:buClr>
+                <a:schemeClr val="accent2">
+                  <a:lumMod val="40000"/>
+                  <a:lumOff val="60000"/>
+                </a:schemeClr>
+              </a:buClr>
+              <a:buFont typeface="Arial" panose="020B0604020202020204" pitchFamily="34" charset="0"/>
+              <a:buChar char="•"/>
+            </a:pPr>
+            <a:r>
+              <a:rPr lang="en-US" dirty="0"/>
+              <a:t>Display group recommendations and the top 10 movies using disagreements-aware aggregation.</a:t>
+            </a:r>
+            <a:endParaRPr lang="de-DE" dirty="0"/>
+          </a:p>
+        </p:txBody>
+      </p:sp>
+      <p:sp>
+        <p:nvSpPr>
+          <p:cNvPr id="4" name="Date Placeholder 3">
+            <a:extLst>
+              <a:ext uri="{FF2B5EF4-FFF2-40B4-BE49-F238E27FC236}">
+                <a16:creationId xmlns:a16="http://schemas.microsoft.com/office/drawing/2014/main" id="{B3E8D07C-2234-CF47-3012-3C416E034596}"/>
+              </a:ext>
+            </a:extLst>
+          </p:cNvPr>
+          <p:cNvSpPr>
+            <a:spLocks noGrp="1"/>
+          </p:cNvSpPr>
+          <p:nvPr>
+            <p:ph type="dt" sz="half" idx="10"/>
+          </p:nvPr>
+        </p:nvSpPr>
+        <p:spPr/>
+        <p:txBody>
+          <a:bodyPr/>
+          <a:lstStyle/>
+          <a:p>
+            <a:pPr rtl="0"/>
+            <a:r>
+              <a:rPr lang="de-DE" noProof="0" dirty="0"/>
+              <a:t>15.11.2023</a:t>
+            </a:r>
+          </a:p>
+        </p:txBody>
+      </p:sp>
+      <p:sp>
+        <p:nvSpPr>
+          <p:cNvPr id="8" name="Footer Placeholder 7">
+            <a:extLst>
+              <a:ext uri="{FF2B5EF4-FFF2-40B4-BE49-F238E27FC236}">
+                <a16:creationId xmlns:a16="http://schemas.microsoft.com/office/drawing/2014/main" id="{3E361E85-E429-3E6C-CD24-1DB3EA3431C5}"/>
+              </a:ext>
+            </a:extLst>
+          </p:cNvPr>
+          <p:cNvSpPr>
+            <a:spLocks noGrp="1"/>
+          </p:cNvSpPr>
+          <p:nvPr>
+            <p:ph type="ftr" sz="quarter" idx="11"/>
+          </p:nvPr>
+        </p:nvSpPr>
+        <p:spPr/>
+        <p:txBody>
+          <a:bodyPr/>
+          <a:lstStyle/>
+          <a:p>
+            <a:pPr rtl="0"/>
+            <a:r>
+              <a:rPr lang="de-DE" dirty="0"/>
+              <a:t>DATA.ML.360-2023-2024-1-TAU </a:t>
+            </a:r>
+            <a:r>
+              <a:rPr lang="de-DE" dirty="0" err="1"/>
+              <a:t>Assignmnt</a:t>
+            </a:r>
+            <a:r>
+              <a:rPr lang="de-DE" dirty="0"/>
+              <a:t> II</a:t>
+            </a:r>
+          </a:p>
+        </p:txBody>
+      </p:sp>
+      <p:sp>
+        <p:nvSpPr>
+          <p:cNvPr id="9" name="Slide Number Placeholder 8">
+            <a:extLst>
+              <a:ext uri="{FF2B5EF4-FFF2-40B4-BE49-F238E27FC236}">
+                <a16:creationId xmlns:a16="http://schemas.microsoft.com/office/drawing/2014/main" id="{2E23764D-75BF-3346-34B3-C064E7C040B1}"/>
+              </a:ext>
+            </a:extLst>
+          </p:cNvPr>
+          <p:cNvSpPr>
+            <a:spLocks noGrp="1"/>
+          </p:cNvSpPr>
+          <p:nvPr>
+            <p:ph type="sldNum" sz="quarter" idx="12"/>
+          </p:nvPr>
+        </p:nvSpPr>
+        <p:spPr/>
+        <p:txBody>
+          <a:bodyPr/>
+          <a:lstStyle/>
+          <a:p>
+            <a:pPr rtl="0"/>
+            <a:fld id="{28844951-7827-47D4-8276-7DDE1FA7D85A}" type="slidenum">
+              <a:rPr lang="de-DE" noProof="0" smtClean="0"/>
+              <a:t>5</a:t>
+            </a:fld>
+            <a:endParaRPr lang="de-DE" noProof="0"/>
+          </a:p>
+        </p:txBody>
+      </p:sp>
       <p:pic>
         <p:nvPicPr>
-          <p:cNvPr id="15" name="Picture 14">
-            <a:extLst>
-              <a:ext uri="{FF2B5EF4-FFF2-40B4-BE49-F238E27FC236}">
-                <a16:creationId xmlns:a16="http://schemas.microsoft.com/office/drawing/2014/main" id="{50D2200F-9D25-FE01-AB1B-3E8A903275B4}"/>
+          <p:cNvPr id="6" name="Kuva 5">
+            <a:extLst>
+              <a:ext uri="{FF2B5EF4-FFF2-40B4-BE49-F238E27FC236}">
+                <a16:creationId xmlns:a16="http://schemas.microsoft.com/office/drawing/2014/main" id="{7924C9B9-FC4D-D1BD-F6B3-FB6FE3C212BD}"/>
               </a:ext>
             </a:extLst>
           </p:cNvPr>
@@ -10288,246 +10785,14 @@
         </p:blipFill>
         <p:spPr>
           <a:xfrm>
-            <a:off x="0" y="3794045"/>
-            <a:ext cx="12192000" cy="3063955"/>
+            <a:off x="0" y="4814546"/>
+            <a:ext cx="12192000" cy="2094625"/>
           </a:xfrm>
           <a:prstGeom prst="rect">
             <a:avLst/>
           </a:prstGeom>
         </p:spPr>
       </p:pic>
-      <p:sp>
-        <p:nvSpPr>
-          <p:cNvPr id="2" name="Title 1">
-            <a:extLst>
-              <a:ext uri="{FF2B5EF4-FFF2-40B4-BE49-F238E27FC236}">
-                <a16:creationId xmlns:a16="http://schemas.microsoft.com/office/drawing/2014/main" id="{E46C5A0A-5F73-0840-583F-6EDAC3B240B9}"/>
-              </a:ext>
-            </a:extLst>
-          </p:cNvPr>
-          <p:cNvSpPr>
-            <a:spLocks noGrp="1"/>
-          </p:cNvSpPr>
-          <p:nvPr>
-            <p:ph type="title"/>
-          </p:nvPr>
-        </p:nvSpPr>
-        <p:spPr>
-          <a:xfrm>
-            <a:off x="519648" y="374480"/>
-            <a:ext cx="11406704" cy="830263"/>
-          </a:xfrm>
-          <a:noFill/>
-        </p:spPr>
-        <p:txBody>
-          <a:bodyPr/>
-          <a:lstStyle/>
-          <a:p>
-            <a:r>
-              <a:rPr lang="de-DE" dirty="0" err="1"/>
-              <a:t>group_recommendation_disagreements</a:t>
-            </a:r>
-            <a:endParaRPr lang="de-DE" dirty="0"/>
-          </a:p>
-        </p:txBody>
-      </p:sp>
-      <p:sp>
-        <p:nvSpPr>
-          <p:cNvPr id="3" name="Content Placeholder 2">
-            <a:extLst>
-              <a:ext uri="{FF2B5EF4-FFF2-40B4-BE49-F238E27FC236}">
-                <a16:creationId xmlns:a16="http://schemas.microsoft.com/office/drawing/2014/main" id="{37D47648-83A7-DF6C-5E2B-77318F0F55E6}"/>
-              </a:ext>
-            </a:extLst>
-          </p:cNvPr>
-          <p:cNvSpPr>
-            <a:spLocks noGrp="1"/>
-          </p:cNvSpPr>
-          <p:nvPr>
-            <p:ph idx="1"/>
-          </p:nvPr>
-        </p:nvSpPr>
-        <p:spPr>
-          <a:xfrm>
-            <a:off x="519648" y="1157786"/>
-            <a:ext cx="8327938" cy="2657517"/>
-          </a:xfrm>
-          <a:noFill/>
-        </p:spPr>
-        <p:txBody>
-          <a:bodyPr/>
-          <a:lstStyle/>
-          <a:p>
-            <a:pPr marL="342900" indent="-342900">
-              <a:buClr>
-                <a:schemeClr val="accent2">
-                  <a:lumMod val="40000"/>
-                  <a:lumOff val="60000"/>
-                </a:schemeClr>
-              </a:buClr>
-              <a:buFont typeface="Arial" panose="020B0604020202020204" pitchFamily="34" charset="0"/>
-              <a:buChar char="•"/>
-            </a:pPr>
-            <a:r>
-              <a:rPr lang="en-US" dirty="0"/>
-              <a:t>Calculate individual predictions for each user in the group using </a:t>
-            </a:r>
-            <a:r>
-              <a:rPr lang="en-US" dirty="0" err="1"/>
-              <a:t>predict_movie_score</a:t>
-            </a:r>
-            <a:r>
-              <a:rPr lang="en-US" dirty="0"/>
-              <a:t>.</a:t>
-            </a:r>
-          </a:p>
-          <a:p>
-            <a:pPr marL="342900" indent="-342900">
-              <a:buClr>
-                <a:schemeClr val="accent2">
-                  <a:lumMod val="40000"/>
-                  <a:lumOff val="60000"/>
-                </a:schemeClr>
-              </a:buClr>
-              <a:buFont typeface="Arial" panose="020B0604020202020204" pitchFamily="34" charset="0"/>
-              <a:buChar char="•"/>
-            </a:pPr>
-            <a:r>
-              <a:rPr lang="en-US" dirty="0"/>
-              <a:t>If no predictions are available, return None.</a:t>
-            </a:r>
-          </a:p>
-          <a:p>
-            <a:pPr marL="342900" indent="-342900">
-              <a:buClr>
-                <a:schemeClr val="accent2">
-                  <a:lumMod val="40000"/>
-                  <a:lumOff val="60000"/>
-                </a:schemeClr>
-              </a:buClr>
-              <a:buFont typeface="Arial" panose="020B0604020202020204" pitchFamily="34" charset="0"/>
-              <a:buChar char="•"/>
-            </a:pPr>
-            <a:r>
-              <a:rPr lang="en-US" dirty="0"/>
-              <a:t>Calculate the standard deviation of ratings across all users and the weighted average disagreements.</a:t>
-            </a:r>
-          </a:p>
-          <a:p>
-            <a:pPr marL="342900" indent="-342900">
-              <a:buClr>
-                <a:schemeClr val="accent2">
-                  <a:lumMod val="40000"/>
-                  <a:lumOff val="60000"/>
-                </a:schemeClr>
-              </a:buClr>
-              <a:buFont typeface="Arial" panose="020B0604020202020204" pitchFamily="34" charset="0"/>
-              <a:buChar char="•"/>
-            </a:pPr>
-            <a:r>
-              <a:rPr lang="en-US" dirty="0"/>
-              <a:t>Display group recommendations and the top 10 movies using disagreements-aware aggregation.</a:t>
-            </a:r>
-            <a:endParaRPr lang="de-DE" dirty="0"/>
-          </a:p>
-        </p:txBody>
-      </p:sp>
-      <p:sp>
-        <p:nvSpPr>
-          <p:cNvPr id="4" name="Date Placeholder 3">
-            <a:extLst>
-              <a:ext uri="{FF2B5EF4-FFF2-40B4-BE49-F238E27FC236}">
-                <a16:creationId xmlns:a16="http://schemas.microsoft.com/office/drawing/2014/main" id="{B3E8D07C-2234-CF47-3012-3C416E034596}"/>
-              </a:ext>
-            </a:extLst>
-          </p:cNvPr>
-          <p:cNvSpPr>
-            <a:spLocks noGrp="1"/>
-          </p:cNvSpPr>
-          <p:nvPr>
-            <p:ph type="dt" sz="half" idx="10"/>
-          </p:nvPr>
-        </p:nvSpPr>
-        <p:spPr/>
-        <p:txBody>
-          <a:bodyPr/>
-          <a:lstStyle/>
-          <a:p>
-            <a:pPr rtl="0"/>
-            <a:r>
-              <a:rPr lang="de-DE" noProof="0" dirty="0"/>
-              <a:t>15.11.2023</a:t>
-            </a:r>
-          </a:p>
-        </p:txBody>
-      </p:sp>
-      <p:sp>
-        <p:nvSpPr>
-          <p:cNvPr id="8" name="Footer Placeholder 7">
-            <a:extLst>
-              <a:ext uri="{FF2B5EF4-FFF2-40B4-BE49-F238E27FC236}">
-                <a16:creationId xmlns:a16="http://schemas.microsoft.com/office/drawing/2014/main" id="{3E361E85-E429-3E6C-CD24-1DB3EA3431C5}"/>
-              </a:ext>
-            </a:extLst>
-          </p:cNvPr>
-          <p:cNvSpPr>
-            <a:spLocks noGrp="1"/>
-          </p:cNvSpPr>
-          <p:nvPr>
-            <p:ph type="ftr" sz="quarter" idx="11"/>
-          </p:nvPr>
-        </p:nvSpPr>
-        <p:spPr/>
-        <p:txBody>
-          <a:bodyPr/>
-          <a:lstStyle/>
-          <a:p>
-            <a:pPr rtl="0"/>
-            <a:r>
-              <a:rPr lang="de-DE" dirty="0"/>
-              <a:t>DATA.ML.360-2023-2024-1-TAU </a:t>
-            </a:r>
-            <a:r>
-              <a:rPr lang="de-DE" dirty="0" err="1"/>
-              <a:t>Assignmnt</a:t>
-            </a:r>
-            <a:r>
-              <a:rPr lang="de-DE" dirty="0"/>
-              <a:t> II</a:t>
-            </a:r>
-          </a:p>
-        </p:txBody>
-      </p:sp>
-      <p:sp>
-        <p:nvSpPr>
-          <p:cNvPr id="9" name="Slide Number Placeholder 8">
-            <a:extLst>
-              <a:ext uri="{FF2B5EF4-FFF2-40B4-BE49-F238E27FC236}">
-                <a16:creationId xmlns:a16="http://schemas.microsoft.com/office/drawing/2014/main" id="{2E23764D-75BF-3346-34B3-C064E7C040B1}"/>
-              </a:ext>
-            </a:extLst>
-          </p:cNvPr>
-          <p:cNvSpPr>
-            <a:spLocks noGrp="1"/>
-          </p:cNvSpPr>
-          <p:nvPr>
-            <p:ph type="sldNum" sz="quarter" idx="12"/>
-          </p:nvPr>
-        </p:nvSpPr>
-        <p:spPr/>
-        <p:txBody>
-          <a:bodyPr/>
-          <a:lstStyle/>
-          <a:p>
-            <a:pPr rtl="0"/>
-            <a:fld id="{28844951-7827-47D4-8276-7DDE1FA7D85A}" type="slidenum">
-              <a:rPr lang="de-DE" noProof="0" smtClean="0"/>
-              <a:t>5</a:t>
-            </a:fld>
-            <a:endParaRPr lang="de-DE" noProof="0"/>
-          </a:p>
-        </p:txBody>
-      </p:sp>
     </p:spTree>
     <p:extLst>
       <p:ext uri="{BB962C8B-B14F-4D97-AF65-F5344CB8AC3E}">
@@ -11333,12 +11598,22 @@
 </file>
 
 <file path=customXml/item1.xml><?xml version="1.0" encoding="utf-8"?>
-<?mso-contentType ?>
-<FormTemplates xmlns="http://schemas.microsoft.com/sharepoint/v3/contenttype/forms">
-  <Display>DocumentLibraryForm</Display>
-  <Edit>DocumentLibraryForm</Edit>
-  <New>DocumentLibraryForm</New>
-</FormTemplates>
+<p:properties xmlns:p="http://schemas.microsoft.com/office/2006/metadata/properties" xmlns:xsi="http://www.w3.org/2001/XMLSchema-instance" xmlns:pc="http://schemas.microsoft.com/office/infopath/2007/PartnerControls">
+  <documentManagement>
+    <Status xmlns="71af3243-3dd4-4a8d-8c0d-dd76da1f02a5">Not started</Status>
+    <_ip_UnifiedCompliancePolicyUIAction xmlns="http://schemas.microsoft.com/sharepoint/v3" xsi:nil="true"/>
+    <Image xmlns="71af3243-3dd4-4a8d-8c0d-dd76da1f02a5">
+      <Url xsi:nil="true"/>
+      <Description xsi:nil="true"/>
+    </Image>
+    <_ip_UnifiedCompliancePolicyProperties xmlns="http://schemas.microsoft.com/sharepoint/v3" xsi:nil="true"/>
+    <lcf76f155ced4ddcb4097134ff3c332f xmlns="71af3243-3dd4-4a8d-8c0d-dd76da1f02a5">
+      <Terms xmlns="http://schemas.microsoft.com/office/infopath/2007/PartnerControls"/>
+    </lcf76f155ced4ddcb4097134ff3c332f>
+    <TaxCatchAll xmlns="230e9df3-be65-4c73-a93b-d1236ebd677e"/>
+    <MediaServiceKeyPoints xmlns="71af3243-3dd4-4a8d-8c0d-dd76da1f02a5" xsi:nil="true"/>
+  </documentManagement>
+</p:properties>
 </file>
 
 <file path=customXml/item2.xml><?xml version="1.0" encoding="utf-8"?>
@@ -11618,28 +11893,22 @@
 </file>
 
 <file path=customXml/item3.xml><?xml version="1.0" encoding="utf-8"?>
-<p:properties xmlns:p="http://schemas.microsoft.com/office/2006/metadata/properties" xmlns:xsi="http://www.w3.org/2001/XMLSchema-instance" xmlns:pc="http://schemas.microsoft.com/office/infopath/2007/PartnerControls">
-  <documentManagement>
-    <Status xmlns="71af3243-3dd4-4a8d-8c0d-dd76da1f02a5">Not started</Status>
-    <_ip_UnifiedCompliancePolicyUIAction xmlns="http://schemas.microsoft.com/sharepoint/v3" xsi:nil="true"/>
-    <Image xmlns="71af3243-3dd4-4a8d-8c0d-dd76da1f02a5">
-      <Url xsi:nil="true"/>
-      <Description xsi:nil="true"/>
-    </Image>
-    <_ip_UnifiedCompliancePolicyProperties xmlns="http://schemas.microsoft.com/sharepoint/v3" xsi:nil="true"/>
-    <lcf76f155ced4ddcb4097134ff3c332f xmlns="71af3243-3dd4-4a8d-8c0d-dd76da1f02a5">
-      <Terms xmlns="http://schemas.microsoft.com/office/infopath/2007/PartnerControls"/>
-    </lcf76f155ced4ddcb4097134ff3c332f>
-    <TaxCatchAll xmlns="230e9df3-be65-4c73-a93b-d1236ebd677e"/>
-    <MediaServiceKeyPoints xmlns="71af3243-3dd4-4a8d-8c0d-dd76da1f02a5" xsi:nil="true"/>
-  </documentManagement>
-</p:properties>
+<?mso-contentType ?>
+<FormTemplates xmlns="http://schemas.microsoft.com/sharepoint/v3/contenttype/forms">
+  <Display>DocumentLibraryForm</Display>
+  <Edit>DocumentLibraryForm</Edit>
+  <New>DocumentLibraryForm</New>
+</FormTemplates>
 </file>
 
 <file path=customXml/itemProps1.xml><?xml version="1.0" encoding="utf-8"?>
-<ds:datastoreItem xmlns:ds="http://schemas.openxmlformats.org/officeDocument/2006/customXml" ds:itemID="{5CF4B188-9E41-4609-81DC-EA2587D009AE}">
+<ds:datastoreItem xmlns:ds="http://schemas.openxmlformats.org/officeDocument/2006/customXml" ds:itemID="{DAAFE2A1-77F8-441E-9B9F-DD61C354F4FE}">
   <ds:schemaRefs>
-    <ds:schemaRef ds:uri="http://schemas.microsoft.com/sharepoint/v3/contenttype/forms"/>
+    <ds:schemaRef ds:uri="http://schemas.microsoft.com/office/2006/metadata/properties"/>
+    <ds:schemaRef ds:uri="http://schemas.microsoft.com/office/infopath/2007/PartnerControls"/>
+    <ds:schemaRef ds:uri="71af3243-3dd4-4a8d-8c0d-dd76da1f02a5"/>
+    <ds:schemaRef ds:uri="http://schemas.microsoft.com/sharepoint/v3"/>
+    <ds:schemaRef ds:uri="230e9df3-be65-4c73-a93b-d1236ebd677e"/>
   </ds:schemaRefs>
 </ds:datastoreItem>
 </file>
@@ -11666,13 +11935,9 @@
 </file>
 
 <file path=customXml/itemProps3.xml><?xml version="1.0" encoding="utf-8"?>
-<ds:datastoreItem xmlns:ds="http://schemas.openxmlformats.org/officeDocument/2006/customXml" ds:itemID="{DAAFE2A1-77F8-441E-9B9F-DD61C354F4FE}">
+<ds:datastoreItem xmlns:ds="http://schemas.openxmlformats.org/officeDocument/2006/customXml" ds:itemID="{5CF4B188-9E41-4609-81DC-EA2587D009AE}">
   <ds:schemaRefs>
-    <ds:schemaRef ds:uri="http://schemas.microsoft.com/office/2006/metadata/properties"/>
-    <ds:schemaRef ds:uri="http://schemas.microsoft.com/office/infopath/2007/PartnerControls"/>
-    <ds:schemaRef ds:uri="71af3243-3dd4-4a8d-8c0d-dd76da1f02a5"/>
-    <ds:schemaRef ds:uri="http://schemas.microsoft.com/sharepoint/v3"/>
-    <ds:schemaRef ds:uri="230e9df3-be65-4c73-a93b-d1236ebd677e"/>
+    <ds:schemaRef ds:uri="http://schemas.microsoft.com/sharepoint/v3/contenttype/forms"/>
   </ds:schemaRefs>
 </ds:datastoreItem>
 </file>
</xml_diff>